<commit_message>
Deploying to gh-pages from master @ c7d25e9303eeb2206a9ce1a79d7f84249ced40e6 🚀
</commit_message>
<xml_diff>
--- a/websitepopup/IDTheft.pptx
+++ b/websitepopup/IDTheft.pptx
@@ -298,7 +298,7 @@
           <a:p>
             <a:fld id="{5BCAD085-E8A6-8845-BD4E-CB4CCA059FC4}" type="datetimeFigureOut">
               <a:rPr lang="en-US" smtClean="0"/>
-              <a:t>10/9/2025</a:t>
+              <a:t>10/14/2025</a:t>
             </a:fld>
             <a:endParaRPr lang="en-US"/>
           </a:p>
@@ -610,7 +610,7 @@
           <a:p>
             <a:fld id="{5BCAD085-E8A6-8845-BD4E-CB4CCA059FC4}" type="datetimeFigureOut">
               <a:rPr lang="en-US" smtClean="0"/>
-              <a:t>10/9/2025</a:t>
+              <a:t>10/14/2025</a:t>
             </a:fld>
             <a:endParaRPr lang="en-US"/>
           </a:p>
@@ -832,7 +832,7 @@
           <a:p>
             <a:fld id="{5BCAD085-E8A6-8845-BD4E-CB4CCA059FC4}" type="datetimeFigureOut">
               <a:rPr lang="en-US" smtClean="0"/>
-              <a:t>10/9/2025</a:t>
+              <a:t>10/14/2025</a:t>
             </a:fld>
             <a:endParaRPr lang="en-US"/>
           </a:p>
@@ -1123,7 +1123,7 @@
           <a:p>
             <a:fld id="{5BCAD085-E8A6-8845-BD4E-CB4CCA059FC4}" type="datetimeFigureOut">
               <a:rPr lang="en-US" smtClean="0"/>
-              <a:t>10/9/2025</a:t>
+              <a:t>10/14/2025</a:t>
             </a:fld>
             <a:endParaRPr lang="en-US"/>
           </a:p>
@@ -1577,7 +1577,7 @@
           <a:p>
             <a:fld id="{5BCAD085-E8A6-8845-BD4E-CB4CCA059FC4}" type="datetimeFigureOut">
               <a:rPr lang="en-US" smtClean="0"/>
-              <a:t>10/9/2025</a:t>
+              <a:t>10/14/2025</a:t>
             </a:fld>
             <a:endParaRPr lang="en-US"/>
           </a:p>
@@ -2153,7 +2153,7 @@
           <a:p>
             <a:fld id="{5BCAD085-E8A6-8845-BD4E-CB4CCA059FC4}" type="datetimeFigureOut">
               <a:rPr lang="en-US" smtClean="0"/>
-              <a:t>10/9/2025</a:t>
+              <a:t>10/14/2025</a:t>
             </a:fld>
             <a:endParaRPr lang="en-US"/>
           </a:p>
@@ -3005,7 +3005,7 @@
           <a:p>
             <a:fld id="{5BCAD085-E8A6-8845-BD4E-CB4CCA059FC4}" type="datetimeFigureOut">
               <a:rPr lang="en-US" smtClean="0"/>
-              <a:t>10/9/2025</a:t>
+              <a:t>10/14/2025</a:t>
             </a:fld>
             <a:endParaRPr lang="en-US"/>
           </a:p>
@@ -3210,7 +3210,7 @@
           <a:p>
             <a:fld id="{5BCAD085-E8A6-8845-BD4E-CB4CCA059FC4}" type="datetimeFigureOut">
               <a:rPr lang="en-US" smtClean="0"/>
-              <a:t>10/9/2025</a:t>
+              <a:t>10/14/2025</a:t>
             </a:fld>
             <a:endParaRPr lang="en-US"/>
           </a:p>
@@ -3424,7 +3424,7 @@
           <a:p>
             <a:fld id="{5BCAD085-E8A6-8845-BD4E-CB4CCA059FC4}" type="datetimeFigureOut">
               <a:rPr lang="en-US" smtClean="0"/>
-              <a:t>10/9/2025</a:t>
+              <a:t>10/14/2025</a:t>
             </a:fld>
             <a:endParaRPr lang="en-US"/>
           </a:p>
@@ -3594,7 +3594,7 @@
           <a:p>
             <a:fld id="{5BCAD085-E8A6-8845-BD4E-CB4CCA059FC4}" type="datetimeFigureOut">
               <a:rPr lang="en-US" smtClean="0"/>
-              <a:t>10/9/2025</a:t>
+              <a:t>10/14/2025</a:t>
             </a:fld>
             <a:endParaRPr lang="en-US"/>
           </a:p>
@@ -3799,7 +3799,7 @@
           <a:p>
             <a:fld id="{5BCAD085-E8A6-8845-BD4E-CB4CCA059FC4}" type="datetimeFigureOut">
               <a:rPr lang="en-US" smtClean="0"/>
-              <a:t>10/9/2025</a:t>
+              <a:t>10/14/2025</a:t>
             </a:fld>
             <a:endParaRPr lang="en-US"/>
           </a:p>
@@ -4079,7 +4079,7 @@
           <a:p>
             <a:fld id="{5BCAD085-E8A6-8845-BD4E-CB4CCA059FC4}" type="datetimeFigureOut">
               <a:rPr lang="en-US" smtClean="0"/>
-              <a:t>10/9/2025</a:t>
+              <a:t>10/14/2025</a:t>
             </a:fld>
             <a:endParaRPr lang="en-US"/>
           </a:p>
@@ -4346,7 +4346,7 @@
           <a:p>
             <a:fld id="{5BCAD085-E8A6-8845-BD4E-CB4CCA059FC4}" type="datetimeFigureOut">
               <a:rPr lang="en-US" smtClean="0"/>
-              <a:t>10/9/2025</a:t>
+              <a:t>10/14/2025</a:t>
             </a:fld>
             <a:endParaRPr lang="en-US"/>
           </a:p>
@@ -4761,7 +4761,7 @@
           <a:p>
             <a:fld id="{5BCAD085-E8A6-8845-BD4E-CB4CCA059FC4}" type="datetimeFigureOut">
               <a:rPr lang="en-US" smtClean="0"/>
-              <a:t>10/9/2025</a:t>
+              <a:t>10/14/2025</a:t>
             </a:fld>
             <a:endParaRPr lang="en-US"/>
           </a:p>
@@ -4909,7 +4909,7 @@
           <a:p>
             <a:fld id="{5BCAD085-E8A6-8845-BD4E-CB4CCA059FC4}" type="datetimeFigureOut">
               <a:rPr lang="en-US" smtClean="0"/>
-              <a:t>10/9/2025</a:t>
+              <a:t>10/14/2025</a:t>
             </a:fld>
             <a:endParaRPr lang="en-US"/>
           </a:p>
@@ -5034,7 +5034,7 @@
           <a:p>
             <a:fld id="{5BCAD085-E8A6-8845-BD4E-CB4CCA059FC4}" type="datetimeFigureOut">
               <a:rPr lang="en-US" smtClean="0"/>
-              <a:t>10/9/2025</a:t>
+              <a:t>10/14/2025</a:t>
             </a:fld>
             <a:endParaRPr lang="en-US"/>
           </a:p>
@@ -5313,7 +5313,7 @@
           <a:p>
             <a:fld id="{5BCAD085-E8A6-8845-BD4E-CB4CCA059FC4}" type="datetimeFigureOut">
               <a:rPr lang="en-US" smtClean="0"/>
-              <a:t>10/9/2025</a:t>
+              <a:t>10/14/2025</a:t>
             </a:fld>
             <a:endParaRPr lang="en-US"/>
           </a:p>
@@ -5625,7 +5625,7 @@
           <a:p>
             <a:fld id="{5BCAD085-E8A6-8845-BD4E-CB4CCA059FC4}" type="datetimeFigureOut">
               <a:rPr lang="en-US" smtClean="0"/>
-              <a:t>10/9/2025</a:t>
+              <a:t>10/14/2025</a:t>
             </a:fld>
             <a:endParaRPr lang="en-US"/>
           </a:p>
@@ -5878,7 +5878,7 @@
           <a:p>
             <a:fld id="{5BCAD085-E8A6-8845-BD4E-CB4CCA059FC4}" type="datetimeFigureOut">
               <a:rPr lang="en-US" smtClean="0"/>
-              <a:t>10/9/2025</a:t>
+              <a:t>10/14/2025</a:t>
             </a:fld>
             <a:endParaRPr lang="en-US"/>
           </a:p>
@@ -6560,8 +6560,12 @@
           </a:p>
           <a:p>
             <a:r>
+              <a:rPr lang="en-US"/>
+              <a:t>these </a:t>
+            </a:r>
+            <a:r>
               <a:rPr lang="en-US" dirty="0"/>
-              <a:t>There are the easter eggs in your computer lab storyline</a:t>
+              <a:t>are the easter eggs in your computer lab storyline</a:t>
             </a:r>
           </a:p>
           <a:p>

</xml_diff>